<commit_message>
Time dep now has TDSE
</commit_message>
<xml_diff>
--- a/Tutorial 7 Time Dependent.pptx
+++ b/Tutorial 7 Time Dependent.pptx
@@ -5,10 +5,10 @@
     <p:sldMasterId id="2147483648" r:id="rId4"/>
   </p:sldMasterIdLst>
   <p:notesMasterIdLst>
-    <p:notesMasterId r:id="rId11"/>
+    <p:notesMasterId r:id="rId12"/>
   </p:notesMasterIdLst>
   <p:handoutMasterIdLst>
-    <p:handoutMasterId r:id="rId12"/>
+    <p:handoutMasterId r:id="rId13"/>
   </p:handoutMasterIdLst>
   <p:sldIdLst>
     <p:sldId id="256" r:id="rId5"/>
@@ -16,7 +16,8 @@
     <p:sldId id="267" r:id="rId7"/>
     <p:sldId id="268" r:id="rId8"/>
     <p:sldId id="269" r:id="rId9"/>
-    <p:sldId id="270" r:id="rId10"/>
+    <p:sldId id="271" r:id="rId10"/>
+    <p:sldId id="270" r:id="rId11"/>
   </p:sldIdLst>
   <p:sldSz cx="12192000" cy="6858000"/>
   <p:notesSz cx="6858000" cy="9144000"/>
@@ -219,7 +220,7 @@
           <a:p>
             <a:fld id="{762B48F5-BACC-47D6-A0F7-82FBF9C6BC85}" type="datetimeFigureOut">
               <a:rPr lang="en-US"/>
-              <a:t>3/19/2022</a:t>
+              <a:t>4/5/2022</a:t>
             </a:fld>
             <a:endParaRPr/>
           </a:p>
@@ -384,7 +385,7 @@
           <a:p>
             <a:fld id="{0CB1CD00-5424-4675-AB18-2C419B060449}" type="datetimeFigureOut">
               <a:rPr lang="en-US"/>
-              <a:t>3/19/2022</a:t>
+              <a:t>4/4/2022</a:t>
             </a:fld>
             <a:endParaRPr/>
           </a:p>
@@ -1029,7 +1030,7 @@
           <a:p>
             <a:fld id="{37CC0096-1860-4642-9CD2-0079EA5E7CD1}" type="datetimeFigureOut">
               <a:rPr lang="en-US" smtClean="0"/>
-              <a:t>3/19/2022</a:t>
+              <a:t>4/4/2022</a:t>
             </a:fld>
             <a:endParaRPr lang="en-US"/>
           </a:p>
@@ -1208,7 +1209,7 @@
           <a:p>
             <a:fld id="{37CC0096-1860-4642-9CD2-0079EA5E7CD1}" type="datetimeFigureOut">
               <a:rPr lang="en-US" smtClean="0"/>
-              <a:t>3/19/2022</a:t>
+              <a:t>4/4/2022</a:t>
             </a:fld>
             <a:endParaRPr lang="en-US"/>
           </a:p>
@@ -1381,7 +1382,7 @@
           <a:p>
             <a:fld id="{37CC0096-1860-4642-9CD2-0079EA5E7CD1}" type="datetimeFigureOut">
               <a:rPr lang="en-US" smtClean="0"/>
-              <a:t>3/19/2022</a:t>
+              <a:t>4/4/2022</a:t>
             </a:fld>
             <a:endParaRPr lang="en-US"/>
           </a:p>
@@ -1814,7 +1815,7 @@
           <a:p>
             <a:fld id="{37CC0096-1860-4642-9CD2-0079EA5E7CD1}" type="datetimeFigureOut">
               <a:rPr lang="en-US" smtClean="0"/>
-              <a:t>3/19/2022</a:t>
+              <a:t>4/4/2022</a:t>
             </a:fld>
             <a:endParaRPr lang="en-US"/>
           </a:p>
@@ -2253,7 +2254,7 @@
           <a:p>
             <a:fld id="{37CC0096-1860-4642-9CD2-0079EA5E7CD1}" type="datetimeFigureOut">
               <a:rPr lang="en-US" smtClean="0"/>
-              <a:t>3/19/2022</a:t>
+              <a:t>4/4/2022</a:t>
             </a:fld>
             <a:endParaRPr lang="en-US"/>
           </a:p>
@@ -2370,7 +2371,7 @@
           <a:p>
             <a:fld id="{37CC0096-1860-4642-9CD2-0079EA5E7CD1}" type="datetimeFigureOut">
               <a:rPr lang="en-US" smtClean="0"/>
-              <a:t>3/19/2022</a:t>
+              <a:t>4/4/2022</a:t>
             </a:fld>
             <a:endParaRPr lang="en-US"/>
           </a:p>
@@ -2465,7 +2466,7 @@
           <a:p>
             <a:fld id="{37CC0096-1860-4642-9CD2-0079EA5E7CD1}" type="datetimeFigureOut">
               <a:rPr lang="en-US" smtClean="0"/>
-              <a:t>3/19/2022</a:t>
+              <a:t>4/4/2022</a:t>
             </a:fld>
             <a:endParaRPr lang="en-US"/>
           </a:p>
@@ -2749,7 +2750,7 @@
           <a:p>
             <a:fld id="{37CC0096-1860-4642-9CD2-0079EA5E7CD1}" type="datetimeFigureOut">
               <a:rPr lang="en-US" smtClean="0"/>
-              <a:t>3/19/2022</a:t>
+              <a:t>4/4/2022</a:t>
             </a:fld>
             <a:endParaRPr lang="en-US"/>
           </a:p>
@@ -3060,7 +3061,7 @@
           <a:p>
             <a:fld id="{37CC0096-1860-4642-9CD2-0079EA5E7CD1}" type="datetimeFigureOut">
               <a:rPr lang="en-US" smtClean="0"/>
-              <a:t>3/19/2022</a:t>
+              <a:t>4/4/2022</a:t>
             </a:fld>
             <a:endParaRPr lang="en-US"/>
           </a:p>
@@ -3292,7 +3293,7 @@
             <a:fld id="{37CC0096-1860-4642-9CD2-0079EA5E7CD1}" type="datetimeFigureOut">
               <a:rPr lang="en-US" smtClean="0"/>
               <a:pPr/>
-              <a:t>3/19/2022</a:t>
+              <a:t>4/4/2022</a:t>
             </a:fld>
             <a:endParaRPr lang="en-US"/>
           </a:p>
@@ -4484,6 +4485,77 @@
           <a:chExt cx="0" cy="0"/>
         </a:xfrm>
       </p:grpSpPr>
+      <p:pic>
+        <p:nvPicPr>
+          <p:cNvPr id="5" name="Picture 4">
+            <a:extLst>
+              <a:ext uri="{FF2B5EF4-FFF2-40B4-BE49-F238E27FC236}">
+                <a16:creationId xmlns:a16="http://schemas.microsoft.com/office/drawing/2014/main" id="{FAD202A5-F8B4-4CE6-9117-4281819B7EC2}"/>
+              </a:ext>
+            </a:extLst>
+          </p:cNvPr>
+          <p:cNvPicPr>
+            <a:picLocks noChangeAspect="1"/>
+          </p:cNvPicPr>
+          <p:nvPr/>
+        </p:nvPicPr>
+        <p:blipFill rotWithShape="1">
+          <a:blip r:embed="rId2">
+            <a:extLst>
+              <a:ext uri="{BEBA8EAE-BF5A-486C-A8C5-ECC9F3942E4B}">
+                <a14:imgProps xmlns:a14="http://schemas.microsoft.com/office/drawing/2010/main">
+                  <a14:imgLayer r:embed="rId3">
+                    <a14:imgEffect>
+                      <a14:brightnessContrast bright="-2000"/>
+                    </a14:imgEffect>
+                  </a14:imgLayer>
+                </a14:imgProps>
+              </a:ext>
+            </a:extLst>
+          </a:blip>
+          <a:srcRect l="12500" r="12500" b="33201"/>
+          <a:stretch/>
+        </p:blipFill>
+        <p:spPr>
+          <a:xfrm>
+            <a:off x="863554" y="807554"/>
+            <a:ext cx="10464891" cy="5242892"/>
+          </a:xfrm>
+          <a:prstGeom prst="rect">
+            <a:avLst/>
+          </a:prstGeom>
+        </p:spPr>
+      </p:pic>
+    </p:spTree>
+    <p:extLst>
+      <p:ext uri="{BB962C8B-B14F-4D97-AF65-F5344CB8AC3E}">
+        <p14:creationId xmlns:p14="http://schemas.microsoft.com/office/powerpoint/2010/main" val="206824325"/>
+      </p:ext>
+    </p:extLst>
+  </p:cSld>
+  <p:clrMapOvr>
+    <a:masterClrMapping/>
+  </p:clrMapOvr>
+</p:sld>
+</file>
+
+<file path=ppt/slides/slide7.xml><?xml version="1.0" encoding="utf-8"?>
+<p:sld xmlns:a="http://schemas.openxmlformats.org/drawingml/2006/main" xmlns:r="http://schemas.openxmlformats.org/officeDocument/2006/relationships" xmlns:p="http://schemas.openxmlformats.org/presentationml/2006/main">
+  <p:cSld>
+    <p:spTree>
+      <p:nvGrpSpPr>
+        <p:cNvPr id="1" name=""/>
+        <p:cNvGrpSpPr/>
+        <p:nvPr/>
+      </p:nvGrpSpPr>
+      <p:grpSpPr>
+        <a:xfrm>
+          <a:off x="0" y="0"/>
+          <a:ext cx="0" cy="0"/>
+          <a:chOff x="0" y="0"/>
+          <a:chExt cx="0" cy="0"/>
+        </a:xfrm>
+      </p:grpSpPr>
       <p:sp>
         <p:nvSpPr>
           <p:cNvPr id="2" name="Title 1">
@@ -4507,102 +4579,176 @@
           <a:p>
             <a:r>
               <a:rPr lang="en-AU" dirty="0"/>
-              <a:t>It gets better! The Crank-Nicolson method.</a:t>
-            </a:r>
-          </a:p>
-        </p:txBody>
-      </p:sp>
-      <p:sp>
-        <p:nvSpPr>
-          <p:cNvPr id="3" name="Content Placeholder 2">
-            <a:extLst>
-              <a:ext uri="{FF2B5EF4-FFF2-40B4-BE49-F238E27FC236}">
-                <a16:creationId xmlns:a16="http://schemas.microsoft.com/office/drawing/2014/main" id="{562ED770-9793-4891-8D0C-B92AB44E3F27}"/>
-              </a:ext>
-            </a:extLst>
-          </p:cNvPr>
-          <p:cNvSpPr>
-            <a:spLocks noGrp="1"/>
-          </p:cNvSpPr>
-          <p:nvPr>
-            <p:ph idx="1"/>
-          </p:nvPr>
-        </p:nvSpPr>
-        <p:spPr/>
-        <p:txBody>
-          <a:bodyPr>
-            <a:normAutofit fontScale="92500" lnSpcReduction="10000"/>
-          </a:bodyPr>
-          <a:lstStyle/>
-          <a:p>
-            <a:endParaRPr lang="en-AU" dirty="0"/>
-          </a:p>
-          <a:p>
-            <a:endParaRPr lang="en-AU" dirty="0"/>
-          </a:p>
-          <a:p>
-            <a:endParaRPr lang="en-AU" dirty="0"/>
-          </a:p>
-          <a:p>
-            <a:endParaRPr lang="en-AU" dirty="0"/>
-          </a:p>
-          <a:p>
-            <a:endParaRPr lang="en-AU" dirty="0"/>
-          </a:p>
-          <a:p>
-            <a:pPr marL="0" indent="0">
-              <a:buNone/>
-            </a:pPr>
-            <a:r>
-              <a:rPr lang="en-AU" dirty="0"/>
-              <a:t>Solution? With T(</a:t>
-            </a:r>
-            <a:r>
-              <a:rPr lang="en-AU" dirty="0" err="1"/>
-              <a:t>ti</a:t>
-            </a:r>
-            <a:r>
-              <a:rPr lang="en-AU" dirty="0"/>
-              <a:t>), compute both matrixes (front and back), and then:</a:t>
-            </a:r>
-          </a:p>
-          <a:p>
-            <a:pPr marL="457200" indent="-457200">
-              <a:buAutoNum type="arabicParenR"/>
-            </a:pPr>
-            <a:r>
-              <a:rPr lang="en-AU" dirty="0"/>
-              <a:t>Combine the back matrix and vector into a single vector</a:t>
-            </a:r>
-          </a:p>
-          <a:p>
-            <a:pPr marL="457200" indent="-457200">
-              <a:buAutoNum type="arabicParenR"/>
-            </a:pPr>
-            <a:r>
-              <a:rPr lang="en-AU" dirty="0"/>
-              <a:t>Solve for T(t i+1) as usual.</a:t>
-            </a:r>
-          </a:p>
-          <a:p>
-            <a:pPr marL="0" indent="0">
-              <a:buNone/>
-            </a:pPr>
-            <a:r>
-              <a:rPr lang="en-AU" dirty="0"/>
-              <a:t>Note that we’ll be using </a:t>
-            </a:r>
-            <a:r>
-              <a:rPr lang="en-AU" dirty="0" err="1"/>
-              <a:t>Linalg.solve</a:t>
-            </a:r>
-            <a:r>
-              <a:rPr lang="en-AU" dirty="0"/>
-              <a:t> again, but the Thomas algorithm is definitely the better way to go.</a:t>
-            </a:r>
-          </a:p>
-        </p:txBody>
-      </p:sp>
+              <a:t>The Crank-Nicolson method.</a:t>
+            </a:r>
+          </a:p>
+        </p:txBody>
+      </p:sp>
+      <mc:AlternateContent xmlns:mc="http://schemas.openxmlformats.org/markup-compatibility/2006">
+        <mc:Choice xmlns:a14="http://schemas.microsoft.com/office/drawing/2010/main" Requires="a14">
+          <p:sp>
+            <p:nvSpPr>
+              <p:cNvPr id="3" name="Content Placeholder 2">
+                <a:extLst>
+                  <a:ext uri="{FF2B5EF4-FFF2-40B4-BE49-F238E27FC236}">
+                    <a16:creationId xmlns:a16="http://schemas.microsoft.com/office/drawing/2014/main" id="{562ED770-9793-4891-8D0C-B92AB44E3F27}"/>
+                  </a:ext>
+                </a:extLst>
+              </p:cNvPr>
+              <p:cNvSpPr>
+                <a:spLocks noGrp="1"/>
+              </p:cNvSpPr>
+              <p:nvPr>
+                <p:ph idx="1"/>
+              </p:nvPr>
+            </p:nvSpPr>
+            <p:spPr/>
+            <p:txBody>
+              <a:bodyPr>
+                <a:normAutofit fontScale="92500" lnSpcReduction="20000"/>
+              </a:bodyPr>
+              <a:lstStyle/>
+              <a:p>
+                <a:endParaRPr lang="en-AU" dirty="0"/>
+              </a:p>
+              <a:p>
+                <a:endParaRPr lang="en-AU" dirty="0"/>
+              </a:p>
+              <a:p>
+                <a:endParaRPr lang="en-AU" dirty="0"/>
+              </a:p>
+              <a:p>
+                <a:endParaRPr lang="en-AU" dirty="0"/>
+              </a:p>
+              <a:p>
+                <a:endParaRPr lang="en-AU" dirty="0"/>
+              </a:p>
+              <a:p>
+                <a:pPr marL="0" indent="0">
+                  <a:buNone/>
+                </a:pPr>
+                <a:r>
+                  <a:rPr lang="en-AU" dirty="0"/>
+                  <a:t>Solution? With T(</a:t>
+                </a:r>
+                <a:r>
+                  <a:rPr lang="en-AU" dirty="0" err="1"/>
+                  <a:t>ti</a:t>
+                </a:r>
+                <a:r>
+                  <a:rPr lang="en-AU" dirty="0"/>
+                  <a:t>), compute both matrixes (front and back), and then:</a:t>
+                </a:r>
+              </a:p>
+              <a:p>
+                <a:pPr marL="457200" indent="-457200">
+                  <a:buAutoNum type="arabicParenR"/>
+                </a:pPr>
+                <a:r>
+                  <a:rPr lang="en-AU" dirty="0"/>
+                  <a:t>Combine the back matrix and vector into a single vector leaving it in the form: 	</a:t>
+                </a:r>
+                <a14:m>
+                  <m:oMath xmlns:m="http://schemas.openxmlformats.org/officeDocument/2006/math">
+                    <m:r>
+                      <a:rPr lang="en-US" b="0" i="1" smtClean="0">
+                        <a:latin typeface="Cambria Math" panose="02040503050406030204" pitchFamily="18" charset="0"/>
+                      </a:rPr>
+                      <m:t>𝐴𝑋</m:t>
+                    </m:r>
+                    <m:r>
+                      <a:rPr lang="en-US" b="0" i="1" smtClean="0">
+                        <a:latin typeface="Cambria Math" panose="02040503050406030204" pitchFamily="18" charset="0"/>
+                      </a:rPr>
+                      <m:t>=</m:t>
+                    </m:r>
+                    <m:r>
+                      <a:rPr lang="en-US" b="0" i="1" smtClean="0">
+                        <a:latin typeface="Cambria Math" panose="02040503050406030204" pitchFamily="18" charset="0"/>
+                      </a:rPr>
+                      <m:t>𝐵</m:t>
+                    </m:r>
+                  </m:oMath>
+                </a14:m>
+                <a:endParaRPr lang="en-AU" dirty="0"/>
+              </a:p>
+              <a:p>
+                <a:pPr marL="457200" indent="-457200">
+                  <a:buAutoNum type="arabicParenR"/>
+                </a:pPr>
+                <a:r>
+                  <a:rPr lang="en-AU" dirty="0"/>
+                  <a:t>Solve for T(t i+1) with </a:t>
+                </a:r>
+                <a:r>
+                  <a:rPr lang="en-AU" dirty="0" err="1"/>
+                  <a:t>linalg.solve</a:t>
+                </a:r>
+                <a:r>
+                  <a:rPr lang="en-AU" dirty="0"/>
+                  <a:t>.</a:t>
+                </a:r>
+              </a:p>
+              <a:p>
+                <a:pPr marL="0" indent="0">
+                  <a:buNone/>
+                </a:pPr>
+                <a:r>
+                  <a:rPr lang="en-AU" dirty="0"/>
+                  <a:t>Note </a:t>
+                </a:r>
+                <a:r>
+                  <a:rPr lang="en-AU" dirty="0" err="1"/>
+                  <a:t>linalg.solve</a:t>
+                </a:r>
+                <a:r>
+                  <a:rPr lang="en-AU" dirty="0"/>
+                  <a:t> is ok for 3x3 matrix but becomes inefficient for larger cases, better to use the Thomas algorithm.</a:t>
+                </a:r>
+              </a:p>
+            </p:txBody>
+          </p:sp>
+        </mc:Choice>
+        <mc:Fallback>
+          <p:sp>
+            <p:nvSpPr>
+              <p:cNvPr id="3" name="Content Placeholder 2">
+                <a:extLst>
+                  <a:ext uri="{FF2B5EF4-FFF2-40B4-BE49-F238E27FC236}">
+                    <a16:creationId xmlns:a16="http://schemas.microsoft.com/office/drawing/2014/main" id="{562ED770-9793-4891-8D0C-B92AB44E3F27}"/>
+                  </a:ext>
+                </a:extLst>
+              </p:cNvPr>
+              <p:cNvSpPr>
+                <a:spLocks noGrp="1" noRot="1" noChangeAspect="1" noMove="1" noResize="1" noEditPoints="1" noAdjustHandles="1" noChangeArrowheads="1" noChangeShapeType="1" noTextEdit="1"/>
+              </p:cNvSpPr>
+              <p:nvPr>
+                <p:ph idx="1"/>
+              </p:nvPr>
+            </p:nvSpPr>
+            <p:spPr>
+              <a:blipFill>
+                <a:blip r:embed="rId2"/>
+                <a:stretch>
+                  <a:fillRect l="-667"/>
+                </a:stretch>
+              </a:blipFill>
+            </p:spPr>
+            <p:txBody>
+              <a:bodyPr/>
+              <a:lstStyle/>
+              <a:p>
+                <a:r>
+                  <a:rPr lang="en-AU">
+                    <a:noFill/>
+                  </a:rPr>
+                  <a:t> </a:t>
+                </a:r>
+              </a:p>
+            </p:txBody>
+          </p:sp>
+        </mc:Fallback>
+      </mc:AlternateContent>
       <p:pic>
         <p:nvPicPr>
           <p:cNvPr id="4" name="Picture 3">
@@ -4618,14 +4764,14 @@
           <p:nvPr/>
         </p:nvPicPr>
         <p:blipFill>
-          <a:blip r:embed="rId2"/>
+          <a:blip r:embed="rId3"/>
           <a:stretch>
             <a:fillRect/>
           </a:stretch>
         </p:blipFill>
         <p:spPr>
           <a:xfrm>
-            <a:off x="1931026" y="2492896"/>
+            <a:off x="1931026" y="2132856"/>
             <a:ext cx="8329947" cy="1199381"/>
           </a:xfrm>
           <a:prstGeom prst="rect">
@@ -6470,15 +6616,6 @@
 </file>
 
 <file path=customXml/item2.xml><?xml version="1.0" encoding="utf-8"?>
-<?mso-contentType ?>
-<FormTemplates xmlns="http://schemas.microsoft.com/sharepoint/v3/contenttype/forms">
-  <Display>DocumentLibraryForm</Display>
-  <Edit>AssetEditForm</Edit>
-  <New>DocumentLibraryForm</New>
-</FormTemplates>
-</file>
-
-<file path=customXml/item3.xml><?xml version="1.0" encoding="utf-8"?>
 <p:properties xmlns:p="http://schemas.microsoft.com/office/2006/metadata/properties" xmlns:xsi="http://www.w3.org/2001/XMLSchema-instance" xmlns:pc="http://schemas.microsoft.com/office/infopath/2007/PartnerControls">
   <documentManagement>
     <DirectSourceMarket xmlns="4873beb7-5857-4685-be1f-d57550cc96cc" xsi:nil="true"/>
@@ -6604,6 +6741,15 @@
 </p:properties>
 </file>
 
+<file path=customXml/item3.xml><?xml version="1.0" encoding="utf-8"?>
+<?mso-contentType ?>
+<FormTemplates xmlns="http://schemas.microsoft.com/sharepoint/v3/contenttype/forms">
+  <Display>DocumentLibraryForm</Display>
+  <Edit>AssetEditForm</Edit>
+  <New>DocumentLibraryForm</New>
+</FormTemplates>
+</file>
+
 <file path=customXml/itemProps1.xml><?xml version="1.0" encoding="utf-8"?>
 <ds:datastoreItem xmlns:ds="http://schemas.openxmlformats.org/officeDocument/2006/customXml" ds:itemID="{0B5C6E15-39DC-470B-9445-F754B9458020}">
   <ds:schemaRefs>
@@ -6623,14 +6769,6 @@
 </file>
 
 <file path=customXml/itemProps2.xml><?xml version="1.0" encoding="utf-8"?>
-<ds:datastoreItem xmlns:ds="http://schemas.openxmlformats.org/officeDocument/2006/customXml" ds:itemID="{746CFF6F-D9AA-4BC0-911A-0A1356771912}">
-  <ds:schemaRefs>
-    <ds:schemaRef ds:uri="http://schemas.microsoft.com/sharepoint/v3/contenttype/forms"/>
-  </ds:schemaRefs>
-</ds:datastoreItem>
-</file>
-
-<file path=customXml/itemProps3.xml><?xml version="1.0" encoding="utf-8"?>
 <ds:datastoreItem xmlns:ds="http://schemas.openxmlformats.org/officeDocument/2006/customXml" ds:itemID="{04098515-0C12-46CF-BC7C-69B4A13CD5FA}">
   <ds:schemaRefs>
     <ds:schemaRef ds:uri="http://schemas.microsoft.com/office/2006/documentManagement/types"/>
@@ -6644,4 +6782,12 @@
     <ds:schemaRef ds:uri="http://purl.org/dc/dcmitype/"/>
   </ds:schemaRefs>
 </ds:datastoreItem>
+</file>
+
+<file path=customXml/itemProps3.xml><?xml version="1.0" encoding="utf-8"?>
+<ds:datastoreItem xmlns:ds="http://schemas.openxmlformats.org/officeDocument/2006/customXml" ds:itemID="{746CFF6F-D9AA-4BC0-911A-0A1356771912}">
+  <ds:schemaRefs>
+    <ds:schemaRef ds:uri="http://schemas.microsoft.com/sharepoint/v3/contenttype/forms"/>
+  </ds:schemaRefs>
+</ds:datastoreItem>
 </file>
</xml_diff>